<commit_message>
[rc] pushing the presentation
</commit_message>
<xml_diff>
--- a/DEMAZE.pptx
+++ b/DEMAZE.pptx
@@ -8,12 +8,14 @@
     <p:sldId id="256" r:id="rId2"/>
     <p:sldId id="257" r:id="rId3"/>
     <p:sldId id="258" r:id="rId4"/>
-    <p:sldId id="260" r:id="rId5"/>
-    <p:sldId id="261" r:id="rId6"/>
-    <p:sldId id="262" r:id="rId7"/>
-    <p:sldId id="263" r:id="rId8"/>
-    <p:sldId id="259" r:id="rId9"/>
-    <p:sldId id="264" r:id="rId10"/>
+    <p:sldId id="265" r:id="rId5"/>
+    <p:sldId id="260" r:id="rId6"/>
+    <p:sldId id="261" r:id="rId7"/>
+    <p:sldId id="262" r:id="rId8"/>
+    <p:sldId id="263" r:id="rId9"/>
+    <p:sldId id="259" r:id="rId10"/>
+    <p:sldId id="266" r:id="rId11"/>
+    <p:sldId id="264" r:id="rId12"/>
   </p:sldIdLst>
   <p:sldSz cx="9144000" cy="6858000" type="screen4x3"/>
   <p:notesSz cx="6858000" cy="9144000"/>
@@ -112,6 +114,22 @@
       </a:defRPr>
     </a:lvl9pPr>
   </p:defaultTextStyle>
+  <p:extLst>
+    <p:ext uri="{EFAFB233-063F-42B5-8137-9DF3F51BA10A}">
+      <p15:sldGuideLst xmlns:p15="http://schemas.microsoft.com/office/powerpoint/2012/main">
+        <p15:guide id="1" orient="horz" pos="2160">
+          <p15:clr>
+            <a:srgbClr val="A4A3A4"/>
+          </p15:clr>
+        </p15:guide>
+        <p15:guide id="2" pos="2880">
+          <p15:clr>
+            <a:srgbClr val="A4A3A4"/>
+          </p15:clr>
+        </p15:guide>
+      </p15:sldGuideLst>
+    </p:ext>
+  </p:extLst>
 </p:presentation>
 </file>
 
@@ -296,7 +314,7 @@
           <a:p>
             <a:fld id="{B60C9277-D458-4370-AF81-103321F72427}" type="datetimeFigureOut">
               <a:rPr lang="en-US" smtClean="0"/>
-              <a:t>12/10/2016</a:t>
+              <a:t>12/10/16</a:t>
             </a:fld>
             <a:endParaRPr lang="en-US"/>
           </a:p>
@@ -466,7 +484,7 @@
           <a:p>
             <a:fld id="{B60C9277-D458-4370-AF81-103321F72427}" type="datetimeFigureOut">
               <a:rPr lang="en-US" smtClean="0"/>
-              <a:t>12/10/2016</a:t>
+              <a:t>12/10/16</a:t>
             </a:fld>
             <a:endParaRPr lang="en-US"/>
           </a:p>
@@ -646,7 +664,7 @@
           <a:p>
             <a:fld id="{B60C9277-D458-4370-AF81-103321F72427}" type="datetimeFigureOut">
               <a:rPr lang="en-US" smtClean="0"/>
-              <a:t>12/10/2016</a:t>
+              <a:t>12/10/16</a:t>
             </a:fld>
             <a:endParaRPr lang="en-US"/>
           </a:p>
@@ -816,7 +834,7 @@
           <a:p>
             <a:fld id="{B60C9277-D458-4370-AF81-103321F72427}" type="datetimeFigureOut">
               <a:rPr lang="en-US" smtClean="0"/>
-              <a:t>12/10/2016</a:t>
+              <a:t>12/10/16</a:t>
             </a:fld>
             <a:endParaRPr lang="en-US"/>
           </a:p>
@@ -1062,7 +1080,7 @@
           <a:p>
             <a:fld id="{B60C9277-D458-4370-AF81-103321F72427}" type="datetimeFigureOut">
               <a:rPr lang="en-US" smtClean="0"/>
-              <a:t>12/10/2016</a:t>
+              <a:t>12/10/16</a:t>
             </a:fld>
             <a:endParaRPr lang="en-US"/>
           </a:p>
@@ -1350,7 +1368,7 @@
           <a:p>
             <a:fld id="{B60C9277-D458-4370-AF81-103321F72427}" type="datetimeFigureOut">
               <a:rPr lang="en-US" smtClean="0"/>
-              <a:t>12/10/2016</a:t>
+              <a:t>12/10/16</a:t>
             </a:fld>
             <a:endParaRPr lang="en-US"/>
           </a:p>
@@ -1772,7 +1790,7 @@
           <a:p>
             <a:fld id="{B60C9277-D458-4370-AF81-103321F72427}" type="datetimeFigureOut">
               <a:rPr lang="en-US" smtClean="0"/>
-              <a:t>12/10/2016</a:t>
+              <a:t>12/10/16</a:t>
             </a:fld>
             <a:endParaRPr lang="en-US"/>
           </a:p>
@@ -1890,7 +1908,7 @@
           <a:p>
             <a:fld id="{B60C9277-D458-4370-AF81-103321F72427}" type="datetimeFigureOut">
               <a:rPr lang="en-US" smtClean="0"/>
-              <a:t>12/10/2016</a:t>
+              <a:t>12/10/16</a:t>
             </a:fld>
             <a:endParaRPr lang="en-US"/>
           </a:p>
@@ -1985,7 +2003,7 @@
           <a:p>
             <a:fld id="{B60C9277-D458-4370-AF81-103321F72427}" type="datetimeFigureOut">
               <a:rPr lang="en-US" smtClean="0"/>
-              <a:t>12/10/2016</a:t>
+              <a:t>12/10/16</a:t>
             </a:fld>
             <a:endParaRPr lang="en-US"/>
           </a:p>
@@ -2262,7 +2280,7 @@
           <a:p>
             <a:fld id="{B60C9277-D458-4370-AF81-103321F72427}" type="datetimeFigureOut">
               <a:rPr lang="en-US" smtClean="0"/>
-              <a:t>12/10/2016</a:t>
+              <a:t>12/10/16</a:t>
             </a:fld>
             <a:endParaRPr lang="en-US"/>
           </a:p>
@@ -2515,7 +2533,7 @@
           <a:p>
             <a:fld id="{B60C9277-D458-4370-AF81-103321F72427}" type="datetimeFigureOut">
               <a:rPr lang="en-US" smtClean="0"/>
-              <a:t>12/10/2016</a:t>
+              <a:t>12/10/16</a:t>
             </a:fld>
             <a:endParaRPr lang="en-US"/>
           </a:p>
@@ -2728,7 +2746,7 @@
           <a:p>
             <a:fld id="{B60C9277-D458-4370-AF81-103321F72427}" type="datetimeFigureOut">
               <a:rPr lang="en-US" smtClean="0"/>
-              <a:t>12/10/2016</a:t>
+              <a:t>12/10/16</a:t>
             </a:fld>
             <a:endParaRPr lang="en-US"/>
           </a:p>
@@ -3175,522 +3193,7 @@
 </p:sld>
 </file>
 
-<file path=ppt/slides/slide2.xml><?xml version="1.0" encoding="utf-8"?>
-<p:sld xmlns:a="http://schemas.openxmlformats.org/drawingml/2006/main" xmlns:r="http://schemas.openxmlformats.org/officeDocument/2006/relationships" xmlns:p="http://schemas.openxmlformats.org/presentationml/2006/main">
-  <p:cSld>
-    <p:bg>
-      <p:bgPr>
-        <a:solidFill>
-          <a:srgbClr val="00642D">
-            <a:alpha val="0"/>
-          </a:srgbClr>
-        </a:solidFill>
-        <a:effectLst/>
-      </p:bgPr>
-    </p:bg>
-    <p:spTree>
-      <p:nvGrpSpPr>
-        <p:cNvPr id="1" name=""/>
-        <p:cNvGrpSpPr/>
-        <p:nvPr/>
-      </p:nvGrpSpPr>
-      <p:grpSpPr>
-        <a:xfrm>
-          <a:off x="0" y="0"/>
-          <a:ext cx="0" cy="0"/>
-          <a:chOff x="0" y="0"/>
-          <a:chExt cx="0" cy="0"/>
-        </a:xfrm>
-      </p:grpSpPr>
-      <p:pic>
-        <p:nvPicPr>
-          <p:cNvPr id="6" name="Content Placeholder 5"/>
-          <p:cNvPicPr>
-            <a:picLocks noGrp="1" noChangeAspect="1"/>
-          </p:cNvPicPr>
-          <p:nvPr>
-            <p:ph sz="half" idx="2"/>
-          </p:nvPr>
-        </p:nvPicPr>
-        <p:blipFill>
-          <a:blip r:embed="rId2">
-            <a:extLst>
-              <a:ext uri="{28A0092B-C50C-407E-A947-70E740481C1C}">
-                <a14:useLocalDpi xmlns:a14="http://schemas.microsoft.com/office/drawing/2010/main" val="0"/>
-              </a:ext>
-            </a:extLst>
-          </a:blip>
-          <a:stretch>
-            <a:fillRect/>
-          </a:stretch>
-        </p:blipFill>
-        <p:spPr>
-          <a:xfrm>
-            <a:off x="4876800" y="-13855"/>
-            <a:ext cx="4267200" cy="6916821"/>
-          </a:xfrm>
-        </p:spPr>
-      </p:pic>
-      <p:pic>
-        <p:nvPicPr>
-          <p:cNvPr id="7" name="Content Placeholder 6"/>
-          <p:cNvPicPr>
-            <a:picLocks noGrp="1" noChangeAspect="1"/>
-          </p:cNvPicPr>
-          <p:nvPr>
-            <p:ph sz="half" idx="1"/>
-          </p:nvPr>
-        </p:nvPicPr>
-        <p:blipFill>
-          <a:blip r:embed="rId3" cstate="print">
-            <a:extLst>
-              <a:ext uri="{28A0092B-C50C-407E-A947-70E740481C1C}">
-                <a14:useLocalDpi xmlns:a14="http://schemas.microsoft.com/office/drawing/2010/main" val="0"/>
-              </a:ext>
-            </a:extLst>
-          </a:blip>
-          <a:stretch>
-            <a:fillRect/>
-          </a:stretch>
-        </p:blipFill>
-        <p:spPr>
-          <a:xfrm>
-            <a:off x="0" y="-6927"/>
-            <a:ext cx="4191000" cy="6912256"/>
-          </a:xfrm>
-        </p:spPr>
-      </p:pic>
-    </p:spTree>
-    <p:extLst>
-      <p:ext uri="{BB962C8B-B14F-4D97-AF65-F5344CB8AC3E}">
-        <p14:creationId xmlns:p14="http://schemas.microsoft.com/office/powerpoint/2010/main" val="4078020501"/>
-      </p:ext>
-    </p:extLst>
-  </p:cSld>
-  <p:clrMapOvr>
-    <a:masterClrMapping/>
-  </p:clrMapOvr>
-  <p:timing>
-    <p:tnLst>
-      <p:par>
-        <p:cTn id="1" dur="indefinite" restart="never" nodeType="tmRoot"/>
-      </p:par>
-    </p:tnLst>
-  </p:timing>
-</p:sld>
-</file>
-
-<file path=ppt/slides/slide3.xml><?xml version="1.0" encoding="utf-8"?>
-<p:sld xmlns:a="http://schemas.openxmlformats.org/drawingml/2006/main" xmlns:r="http://schemas.openxmlformats.org/officeDocument/2006/relationships" xmlns:p="http://schemas.openxmlformats.org/presentationml/2006/main">
-  <p:cSld>
-    <p:spTree>
-      <p:nvGrpSpPr>
-        <p:cNvPr id="1" name=""/>
-        <p:cNvGrpSpPr/>
-        <p:nvPr/>
-      </p:nvGrpSpPr>
-      <p:grpSpPr>
-        <a:xfrm>
-          <a:off x="0" y="0"/>
-          <a:ext cx="0" cy="0"/>
-          <a:chOff x="0" y="0"/>
-          <a:chExt cx="0" cy="0"/>
-        </a:xfrm>
-      </p:grpSpPr>
-      <p:sp>
-        <p:nvSpPr>
-          <p:cNvPr id="2" name="Title 1"/>
-          <p:cNvSpPr>
-            <a:spLocks noGrp="1"/>
-          </p:cNvSpPr>
-          <p:nvPr>
-            <p:ph type="title"/>
-          </p:nvPr>
-        </p:nvSpPr>
-        <p:spPr/>
-        <p:txBody>
-          <a:bodyPr/>
-          <a:lstStyle/>
-          <a:p>
-            <a:r>
-              <a:rPr lang="en-US" b="1" dirty="0" smtClean="0">
-                <a:solidFill>
-                  <a:srgbClr val="00642D"/>
-                </a:solidFill>
-              </a:rPr>
-              <a:t>Symptoms</a:t>
-            </a:r>
-            <a:endParaRPr lang="en-US" b="1" dirty="0">
-              <a:solidFill>
-                <a:srgbClr val="00642D"/>
-              </a:solidFill>
-            </a:endParaRPr>
-          </a:p>
-        </p:txBody>
-      </p:sp>
-      <p:sp>
-        <p:nvSpPr>
-          <p:cNvPr id="3" name="Content Placeholder 2"/>
-          <p:cNvSpPr>
-            <a:spLocks noGrp="1"/>
-          </p:cNvSpPr>
-          <p:nvPr>
-            <p:ph idx="1"/>
-          </p:nvPr>
-        </p:nvSpPr>
-        <p:spPr/>
-        <p:txBody>
-          <a:bodyPr/>
-          <a:lstStyle/>
-          <a:p>
-            <a:pPr>
-              <a:lnSpc>
-                <a:spcPct val="150000"/>
-              </a:lnSpc>
-            </a:pPr>
-            <a:r>
-              <a:rPr lang="en-US" dirty="0" smtClean="0"/>
-              <a:t>Disorientation</a:t>
-            </a:r>
-          </a:p>
-          <a:p>
-            <a:pPr>
-              <a:lnSpc>
-                <a:spcPct val="150000"/>
-              </a:lnSpc>
-            </a:pPr>
-            <a:r>
-              <a:rPr lang="en-US" dirty="0" smtClean="0"/>
-              <a:t>Memory Loss</a:t>
-            </a:r>
-          </a:p>
-          <a:p>
-            <a:pPr>
-              <a:lnSpc>
-                <a:spcPct val="150000"/>
-              </a:lnSpc>
-            </a:pPr>
-            <a:r>
-              <a:rPr lang="en-US" dirty="0" smtClean="0"/>
-              <a:t>Difficulty Walking</a:t>
-            </a:r>
-          </a:p>
-          <a:p>
-            <a:pPr>
-              <a:lnSpc>
-                <a:spcPct val="150000"/>
-              </a:lnSpc>
-            </a:pPr>
-            <a:r>
-              <a:rPr lang="en-US" dirty="0" smtClean="0"/>
-              <a:t>Fainting and Falling</a:t>
-            </a:r>
-          </a:p>
-          <a:p>
-            <a:pPr>
-              <a:lnSpc>
-                <a:spcPct val="150000"/>
-              </a:lnSpc>
-            </a:pPr>
-            <a:r>
-              <a:rPr lang="en-US" dirty="0" smtClean="0"/>
-              <a:t>Visual Hallucinations</a:t>
-            </a:r>
-          </a:p>
-          <a:p>
-            <a:endParaRPr lang="en-US" dirty="0"/>
-          </a:p>
-        </p:txBody>
-      </p:sp>
-    </p:spTree>
-    <p:extLst>
-      <p:ext uri="{BB962C8B-B14F-4D97-AF65-F5344CB8AC3E}">
-        <p14:creationId xmlns:p14="http://schemas.microsoft.com/office/powerpoint/2010/main" val="2021748551"/>
-      </p:ext>
-    </p:extLst>
-  </p:cSld>
-  <p:clrMapOvr>
-    <a:masterClrMapping/>
-  </p:clrMapOvr>
-  <p:timing>
-    <p:tnLst>
-      <p:par>
-        <p:cTn id="1" dur="indefinite" restart="never" nodeType="tmRoot"/>
-      </p:par>
-    </p:tnLst>
-  </p:timing>
-</p:sld>
-</file>
-
-<file path=ppt/slides/slide4.xml><?xml version="1.0" encoding="utf-8"?>
-<p:sld xmlns:a="http://schemas.openxmlformats.org/drawingml/2006/main" xmlns:r="http://schemas.openxmlformats.org/officeDocument/2006/relationships" xmlns:p="http://schemas.openxmlformats.org/presentationml/2006/main">
-  <p:cSld>
-    <p:spTree>
-      <p:nvGrpSpPr>
-        <p:cNvPr id="1" name=""/>
-        <p:cNvGrpSpPr/>
-        <p:nvPr/>
-      </p:nvGrpSpPr>
-      <p:grpSpPr>
-        <a:xfrm>
-          <a:off x="0" y="0"/>
-          <a:ext cx="0" cy="0"/>
-          <a:chOff x="0" y="0"/>
-          <a:chExt cx="0" cy="0"/>
-        </a:xfrm>
-      </p:grpSpPr>
-      <p:pic>
-        <p:nvPicPr>
-          <p:cNvPr id="8" name="Picture 7"/>
-          <p:cNvPicPr>
-            <a:picLocks noChangeAspect="1"/>
-          </p:cNvPicPr>
-          <p:nvPr/>
-        </p:nvPicPr>
-        <p:blipFill>
-          <a:blip r:embed="rId2">
-            <a:extLst>
-              <a:ext uri="{28A0092B-C50C-407E-A947-70E740481C1C}">
-                <a14:useLocalDpi xmlns:a14="http://schemas.microsoft.com/office/drawing/2010/main" val="0"/>
-              </a:ext>
-            </a:extLst>
-          </a:blip>
-          <a:stretch>
-            <a:fillRect/>
-          </a:stretch>
-        </p:blipFill>
-        <p:spPr>
-          <a:xfrm>
-            <a:off x="990600" y="381000"/>
-            <a:ext cx="7219950" cy="6188529"/>
-          </a:xfrm>
-          <a:prstGeom prst="rect">
-            <a:avLst/>
-          </a:prstGeom>
-        </p:spPr>
-      </p:pic>
-    </p:spTree>
-    <p:extLst>
-      <p:ext uri="{BB962C8B-B14F-4D97-AF65-F5344CB8AC3E}">
-        <p14:creationId xmlns:p14="http://schemas.microsoft.com/office/powerpoint/2010/main" val="2927391004"/>
-      </p:ext>
-    </p:extLst>
-  </p:cSld>
-  <p:clrMapOvr>
-    <a:masterClrMapping/>
-  </p:clrMapOvr>
-  <p:timing>
-    <p:tnLst>
-      <p:par>
-        <p:cTn id="1" dur="indefinite" restart="never" nodeType="tmRoot"/>
-      </p:par>
-    </p:tnLst>
-  </p:timing>
-</p:sld>
-</file>
-
-<file path=ppt/slides/slide5.xml><?xml version="1.0" encoding="utf-8"?>
-<p:sld xmlns:a="http://schemas.openxmlformats.org/drawingml/2006/main" xmlns:r="http://schemas.openxmlformats.org/officeDocument/2006/relationships" xmlns:p="http://schemas.openxmlformats.org/presentationml/2006/main">
-  <p:cSld>
-    <p:spTree>
-      <p:nvGrpSpPr>
-        <p:cNvPr id="1" name=""/>
-        <p:cNvGrpSpPr/>
-        <p:nvPr/>
-      </p:nvGrpSpPr>
-      <p:grpSpPr>
-        <a:xfrm>
-          <a:off x="0" y="0"/>
-          <a:ext cx="0" cy="0"/>
-          <a:chOff x="0" y="0"/>
-          <a:chExt cx="0" cy="0"/>
-        </a:xfrm>
-      </p:grpSpPr>
-      <p:pic>
-        <p:nvPicPr>
-          <p:cNvPr id="2" name="Picture 1"/>
-          <p:cNvPicPr>
-            <a:picLocks noChangeAspect="1"/>
-          </p:cNvPicPr>
-          <p:nvPr/>
-        </p:nvPicPr>
-        <p:blipFill>
-          <a:blip r:embed="rId2">
-            <a:extLst>
-              <a:ext uri="{28A0092B-C50C-407E-A947-70E740481C1C}">
-                <a14:useLocalDpi xmlns:a14="http://schemas.microsoft.com/office/drawing/2010/main" val="0"/>
-              </a:ext>
-            </a:extLst>
-          </a:blip>
-          <a:stretch>
-            <a:fillRect/>
-          </a:stretch>
-        </p:blipFill>
-        <p:spPr>
-          <a:xfrm>
-            <a:off x="1143000" y="355268"/>
-            <a:ext cx="7122968" cy="6105401"/>
-          </a:xfrm>
-          <a:prstGeom prst="rect">
-            <a:avLst/>
-          </a:prstGeom>
-        </p:spPr>
-      </p:pic>
-    </p:spTree>
-    <p:extLst>
-      <p:ext uri="{BB962C8B-B14F-4D97-AF65-F5344CB8AC3E}">
-        <p14:creationId xmlns:p14="http://schemas.microsoft.com/office/powerpoint/2010/main" val="3325679948"/>
-      </p:ext>
-    </p:extLst>
-  </p:cSld>
-  <p:clrMapOvr>
-    <a:masterClrMapping/>
-  </p:clrMapOvr>
-  <p:timing>
-    <p:tnLst>
-      <p:par>
-        <p:cTn id="1" dur="indefinite" restart="never" nodeType="tmRoot"/>
-      </p:par>
-    </p:tnLst>
-  </p:timing>
-</p:sld>
-</file>
-
-<file path=ppt/slides/slide6.xml><?xml version="1.0" encoding="utf-8"?>
-<p:sld xmlns:a="http://schemas.openxmlformats.org/drawingml/2006/main" xmlns:r="http://schemas.openxmlformats.org/officeDocument/2006/relationships" xmlns:p="http://schemas.openxmlformats.org/presentationml/2006/main">
-  <p:cSld>
-    <p:spTree>
-      <p:nvGrpSpPr>
-        <p:cNvPr id="1" name=""/>
-        <p:cNvGrpSpPr/>
-        <p:nvPr/>
-      </p:nvGrpSpPr>
-      <p:grpSpPr>
-        <a:xfrm>
-          <a:off x="0" y="0"/>
-          <a:ext cx="0" cy="0"/>
-          <a:chOff x="0" y="0"/>
-          <a:chExt cx="0" cy="0"/>
-        </a:xfrm>
-      </p:grpSpPr>
-      <p:pic>
-        <p:nvPicPr>
-          <p:cNvPr id="2" name="Picture 1"/>
-          <p:cNvPicPr>
-            <a:picLocks noChangeAspect="1"/>
-          </p:cNvPicPr>
-          <p:nvPr/>
-        </p:nvPicPr>
-        <p:blipFill>
-          <a:blip r:embed="rId2">
-            <a:extLst>
-              <a:ext uri="{28A0092B-C50C-407E-A947-70E740481C1C}">
-                <a14:useLocalDpi xmlns:a14="http://schemas.microsoft.com/office/drawing/2010/main" val="0"/>
-              </a:ext>
-            </a:extLst>
-          </a:blip>
-          <a:stretch>
-            <a:fillRect/>
-          </a:stretch>
-        </p:blipFill>
-        <p:spPr>
-          <a:xfrm>
-            <a:off x="1143000" y="326572"/>
-            <a:ext cx="6991350" cy="5992586"/>
-          </a:xfrm>
-          <a:prstGeom prst="rect">
-            <a:avLst/>
-          </a:prstGeom>
-        </p:spPr>
-      </p:pic>
-    </p:spTree>
-    <p:extLst>
-      <p:ext uri="{BB962C8B-B14F-4D97-AF65-F5344CB8AC3E}">
-        <p14:creationId xmlns:p14="http://schemas.microsoft.com/office/powerpoint/2010/main" val="1376263727"/>
-      </p:ext>
-    </p:extLst>
-  </p:cSld>
-  <p:clrMapOvr>
-    <a:masterClrMapping/>
-  </p:clrMapOvr>
-  <p:timing>
-    <p:tnLst>
-      <p:par>
-        <p:cTn id="1" dur="indefinite" restart="never" nodeType="tmRoot"/>
-      </p:par>
-    </p:tnLst>
-  </p:timing>
-</p:sld>
-</file>
-
-<file path=ppt/slides/slide7.xml><?xml version="1.0" encoding="utf-8"?>
-<p:sld xmlns:a="http://schemas.openxmlformats.org/drawingml/2006/main" xmlns:r="http://schemas.openxmlformats.org/officeDocument/2006/relationships" xmlns:p="http://schemas.openxmlformats.org/presentationml/2006/main">
-  <p:cSld>
-    <p:spTree>
-      <p:nvGrpSpPr>
-        <p:cNvPr id="1" name=""/>
-        <p:cNvGrpSpPr/>
-        <p:nvPr/>
-      </p:nvGrpSpPr>
-      <p:grpSpPr>
-        <a:xfrm>
-          <a:off x="0" y="0"/>
-          <a:ext cx="0" cy="0"/>
-          <a:chOff x="0" y="0"/>
-          <a:chExt cx="0" cy="0"/>
-        </a:xfrm>
-      </p:grpSpPr>
-      <p:pic>
-        <p:nvPicPr>
-          <p:cNvPr id="2" name="Picture 1"/>
-          <p:cNvPicPr>
-            <a:picLocks noChangeAspect="1"/>
-          </p:cNvPicPr>
-          <p:nvPr/>
-        </p:nvPicPr>
-        <p:blipFill>
-          <a:blip r:embed="rId2">
-            <a:extLst>
-              <a:ext uri="{28A0092B-C50C-407E-A947-70E740481C1C}">
-                <a14:useLocalDpi xmlns:a14="http://schemas.microsoft.com/office/drawing/2010/main" val="0"/>
-              </a:ext>
-            </a:extLst>
-          </a:blip>
-          <a:stretch>
-            <a:fillRect/>
-          </a:stretch>
-        </p:blipFill>
-        <p:spPr>
-          <a:xfrm>
-            <a:off x="1138381" y="401782"/>
-            <a:ext cx="6905914" cy="5919356"/>
-          </a:xfrm>
-          <a:prstGeom prst="rect">
-            <a:avLst/>
-          </a:prstGeom>
-        </p:spPr>
-      </p:pic>
-    </p:spTree>
-    <p:extLst>
-      <p:ext uri="{BB962C8B-B14F-4D97-AF65-F5344CB8AC3E}">
-        <p14:creationId xmlns:p14="http://schemas.microsoft.com/office/powerpoint/2010/main" val="2271531421"/>
-      </p:ext>
-    </p:extLst>
-  </p:cSld>
-  <p:clrMapOvr>
-    <a:masterClrMapping/>
-  </p:clrMapOvr>
-  <p:timing>
-    <p:tnLst>
-      <p:par>
-        <p:cTn id="1" dur="indefinite" restart="never" nodeType="tmRoot"/>
-      </p:par>
-    </p:tnLst>
-  </p:timing>
-</p:sld>
-</file>
-
-<file path=ppt/slides/slide8.xml><?xml version="1.0" encoding="utf-8"?>
+<file path=ppt/slides/slide10.xml><?xml version="1.0" encoding="utf-8"?>
 <p:sld xmlns:a="http://schemas.openxmlformats.org/drawingml/2006/main" xmlns:r="http://schemas.openxmlformats.org/officeDocument/2006/relationships" xmlns:p="http://schemas.openxmlformats.org/presentationml/2006/main">
   <p:cSld>
     <p:spTree>
@@ -3830,7 +3333,673 @@
     </p:spTree>
     <p:extLst>
       <p:ext uri="{BB962C8B-B14F-4D97-AF65-F5344CB8AC3E}">
-        <p14:creationId xmlns:p14="http://schemas.microsoft.com/office/powerpoint/2010/main" val="121013334"/>
+        <p14:creationId xmlns:p14="http://schemas.microsoft.com/office/powerpoint/2010/main" val="975614498"/>
+      </p:ext>
+    </p:extLst>
+  </p:cSld>
+  <p:clrMapOvr>
+    <a:masterClrMapping/>
+  </p:clrMapOvr>
+  <p:timing>
+    <p:tnLst>
+      <p:par>
+        <p:cTn id="1" dur="indefinite" restart="never" nodeType="tmRoot"/>
+      </p:par>
+    </p:tnLst>
+  </p:timing>
+</p:sld>
+</file>
+
+<file path=ppt/slides/slide11.xml><?xml version="1.0" encoding="utf-8"?>
+<p:sld xmlns:a="http://schemas.openxmlformats.org/drawingml/2006/main" xmlns:r="http://schemas.openxmlformats.org/officeDocument/2006/relationships" xmlns:p="http://schemas.openxmlformats.org/presentationml/2006/main">
+  <p:cSld>
+    <p:spTree>
+      <p:nvGrpSpPr>
+        <p:cNvPr id="1" name=""/>
+        <p:cNvGrpSpPr/>
+        <p:nvPr/>
+      </p:nvGrpSpPr>
+      <p:grpSpPr>
+        <a:xfrm>
+          <a:off x="0" y="0"/>
+          <a:ext cx="0" cy="0"/>
+          <a:chOff x="0" y="0"/>
+          <a:chExt cx="0" cy="0"/>
+        </a:xfrm>
+      </p:grpSpPr>
+      <p:sp>
+        <p:nvSpPr>
+          <p:cNvPr id="2" name="Title 1"/>
+          <p:cNvSpPr>
+            <a:spLocks noGrp="1"/>
+          </p:cNvSpPr>
+          <p:nvPr>
+            <p:ph type="title"/>
+          </p:nvPr>
+        </p:nvSpPr>
+        <p:spPr>
+          <a:xfrm>
+            <a:off x="457200" y="2590800"/>
+            <a:ext cx="8229600" cy="1143000"/>
+          </a:xfrm>
+        </p:spPr>
+        <p:txBody>
+          <a:bodyPr/>
+          <a:lstStyle/>
+          <a:p>
+            <a:r>
+              <a:rPr lang="en-US" b="1" dirty="0" smtClean="0">
+                <a:solidFill>
+                  <a:srgbClr val="00642D"/>
+                </a:solidFill>
+              </a:rPr>
+              <a:t>Thank you for your attention!</a:t>
+            </a:r>
+            <a:endParaRPr lang="en-US" b="1" dirty="0">
+              <a:solidFill>
+                <a:srgbClr val="00642D"/>
+              </a:solidFill>
+            </a:endParaRPr>
+          </a:p>
+        </p:txBody>
+      </p:sp>
+    </p:spTree>
+    <p:extLst>
+      <p:ext uri="{BB962C8B-B14F-4D97-AF65-F5344CB8AC3E}">
+        <p14:creationId xmlns:p14="http://schemas.microsoft.com/office/powerpoint/2010/main" val="3737794404"/>
+      </p:ext>
+    </p:extLst>
+  </p:cSld>
+  <p:clrMapOvr>
+    <a:masterClrMapping/>
+  </p:clrMapOvr>
+  <p:timing>
+    <p:tnLst>
+      <p:par>
+        <p:cTn id="1" dur="indefinite" restart="never" nodeType="tmRoot"/>
+      </p:par>
+    </p:tnLst>
+  </p:timing>
+</p:sld>
+</file>
+
+<file path=ppt/slides/slide2.xml><?xml version="1.0" encoding="utf-8"?>
+<p:sld xmlns:a="http://schemas.openxmlformats.org/drawingml/2006/main" xmlns:r="http://schemas.openxmlformats.org/officeDocument/2006/relationships" xmlns:p="http://schemas.openxmlformats.org/presentationml/2006/main">
+  <p:cSld>
+    <p:bg>
+      <p:bgPr>
+        <a:solidFill>
+          <a:srgbClr val="00642D">
+            <a:alpha val="0"/>
+          </a:srgbClr>
+        </a:solidFill>
+        <a:effectLst/>
+      </p:bgPr>
+    </p:bg>
+    <p:spTree>
+      <p:nvGrpSpPr>
+        <p:cNvPr id="1" name=""/>
+        <p:cNvGrpSpPr/>
+        <p:nvPr/>
+      </p:nvGrpSpPr>
+      <p:grpSpPr>
+        <a:xfrm>
+          <a:off x="0" y="0"/>
+          <a:ext cx="0" cy="0"/>
+          <a:chOff x="0" y="0"/>
+          <a:chExt cx="0" cy="0"/>
+        </a:xfrm>
+      </p:grpSpPr>
+      <p:pic>
+        <p:nvPicPr>
+          <p:cNvPr id="6" name="Content Placeholder 5"/>
+          <p:cNvPicPr>
+            <a:picLocks noGrp="1" noChangeAspect="1"/>
+          </p:cNvPicPr>
+          <p:nvPr>
+            <p:ph sz="half" idx="2"/>
+          </p:nvPr>
+        </p:nvPicPr>
+        <p:blipFill>
+          <a:blip r:embed="rId2">
+            <a:extLst>
+              <a:ext uri="{28A0092B-C50C-407E-A947-70E740481C1C}">
+                <a14:useLocalDpi xmlns:a14="http://schemas.microsoft.com/office/drawing/2010/main" val="0"/>
+              </a:ext>
+            </a:extLst>
+          </a:blip>
+          <a:stretch>
+            <a:fillRect/>
+          </a:stretch>
+        </p:blipFill>
+        <p:spPr>
+          <a:xfrm>
+            <a:off x="4876800" y="-13855"/>
+            <a:ext cx="4267200" cy="6916821"/>
+          </a:xfrm>
+        </p:spPr>
+      </p:pic>
+      <p:pic>
+        <p:nvPicPr>
+          <p:cNvPr id="7" name="Content Placeholder 6"/>
+          <p:cNvPicPr>
+            <a:picLocks noGrp="1" noChangeAspect="1"/>
+          </p:cNvPicPr>
+          <p:nvPr>
+            <p:ph sz="half" idx="1"/>
+          </p:nvPr>
+        </p:nvPicPr>
+        <p:blipFill>
+          <a:blip r:embed="rId3" cstate="print">
+            <a:extLst>
+              <a:ext uri="{28A0092B-C50C-407E-A947-70E740481C1C}">
+                <a14:useLocalDpi xmlns:a14="http://schemas.microsoft.com/office/drawing/2010/main" val="0"/>
+              </a:ext>
+            </a:extLst>
+          </a:blip>
+          <a:stretch>
+            <a:fillRect/>
+          </a:stretch>
+        </p:blipFill>
+        <p:spPr>
+          <a:xfrm>
+            <a:off x="0" y="-6927"/>
+            <a:ext cx="4191000" cy="6912256"/>
+          </a:xfrm>
+        </p:spPr>
+      </p:pic>
+    </p:spTree>
+    <p:extLst>
+      <p:ext uri="{BB962C8B-B14F-4D97-AF65-F5344CB8AC3E}">
+        <p14:creationId xmlns:p14="http://schemas.microsoft.com/office/powerpoint/2010/main" val="4078020501"/>
+      </p:ext>
+    </p:extLst>
+  </p:cSld>
+  <p:clrMapOvr>
+    <a:masterClrMapping/>
+  </p:clrMapOvr>
+  <p:timing>
+    <p:tnLst>
+      <p:par>
+        <p:cTn id="1" dur="indefinite" restart="never" nodeType="tmRoot"/>
+      </p:par>
+    </p:tnLst>
+  </p:timing>
+</p:sld>
+</file>
+
+<file path=ppt/slides/slide3.xml><?xml version="1.0" encoding="utf-8"?>
+<p:sld xmlns:a="http://schemas.openxmlformats.org/drawingml/2006/main" xmlns:r="http://schemas.openxmlformats.org/officeDocument/2006/relationships" xmlns:p="http://schemas.openxmlformats.org/presentationml/2006/main">
+  <p:cSld>
+    <p:spTree>
+      <p:nvGrpSpPr>
+        <p:cNvPr id="1" name=""/>
+        <p:cNvGrpSpPr/>
+        <p:nvPr/>
+      </p:nvGrpSpPr>
+      <p:grpSpPr>
+        <a:xfrm>
+          <a:off x="0" y="0"/>
+          <a:ext cx="0" cy="0"/>
+          <a:chOff x="0" y="0"/>
+          <a:chExt cx="0" cy="0"/>
+        </a:xfrm>
+      </p:grpSpPr>
+      <p:sp>
+        <p:nvSpPr>
+          <p:cNvPr id="2" name="Title 1"/>
+          <p:cNvSpPr>
+            <a:spLocks noGrp="1"/>
+          </p:cNvSpPr>
+          <p:nvPr>
+            <p:ph type="title"/>
+          </p:nvPr>
+        </p:nvSpPr>
+        <p:spPr/>
+        <p:txBody>
+          <a:bodyPr/>
+          <a:lstStyle/>
+          <a:p>
+            <a:r>
+              <a:rPr lang="en-US" b="1" dirty="0" smtClean="0">
+                <a:solidFill>
+                  <a:srgbClr val="00642D"/>
+                </a:solidFill>
+              </a:rPr>
+              <a:t>Symptoms</a:t>
+            </a:r>
+            <a:endParaRPr lang="en-US" b="1" dirty="0">
+              <a:solidFill>
+                <a:srgbClr val="00642D"/>
+              </a:solidFill>
+            </a:endParaRPr>
+          </a:p>
+        </p:txBody>
+      </p:sp>
+      <p:sp>
+        <p:nvSpPr>
+          <p:cNvPr id="3" name="Content Placeholder 2"/>
+          <p:cNvSpPr>
+            <a:spLocks noGrp="1"/>
+          </p:cNvSpPr>
+          <p:nvPr>
+            <p:ph idx="1"/>
+          </p:nvPr>
+        </p:nvSpPr>
+        <p:spPr/>
+        <p:txBody>
+          <a:bodyPr/>
+          <a:lstStyle/>
+          <a:p>
+            <a:pPr>
+              <a:lnSpc>
+                <a:spcPct val="150000"/>
+              </a:lnSpc>
+            </a:pPr>
+            <a:r>
+              <a:rPr lang="en-US" dirty="0" smtClean="0"/>
+              <a:t>Disorientation</a:t>
+            </a:r>
+          </a:p>
+          <a:p>
+            <a:pPr>
+              <a:lnSpc>
+                <a:spcPct val="150000"/>
+              </a:lnSpc>
+            </a:pPr>
+            <a:r>
+              <a:rPr lang="en-US" dirty="0" smtClean="0"/>
+              <a:t>Memory Loss</a:t>
+            </a:r>
+          </a:p>
+          <a:p>
+            <a:pPr>
+              <a:lnSpc>
+                <a:spcPct val="150000"/>
+              </a:lnSpc>
+            </a:pPr>
+            <a:r>
+              <a:rPr lang="en-US" dirty="0" smtClean="0"/>
+              <a:t>Difficulty Walking</a:t>
+            </a:r>
+          </a:p>
+          <a:p>
+            <a:pPr>
+              <a:lnSpc>
+                <a:spcPct val="150000"/>
+              </a:lnSpc>
+            </a:pPr>
+            <a:r>
+              <a:rPr lang="en-US" dirty="0" smtClean="0"/>
+              <a:t>Fainting and Falling</a:t>
+            </a:r>
+          </a:p>
+          <a:p>
+            <a:pPr>
+              <a:lnSpc>
+                <a:spcPct val="150000"/>
+              </a:lnSpc>
+            </a:pPr>
+            <a:r>
+              <a:rPr lang="en-US" dirty="0" smtClean="0"/>
+              <a:t>Visual Hallucinations</a:t>
+            </a:r>
+          </a:p>
+          <a:p>
+            <a:endParaRPr lang="en-US" dirty="0"/>
+          </a:p>
+        </p:txBody>
+      </p:sp>
+    </p:spTree>
+    <p:extLst>
+      <p:ext uri="{BB962C8B-B14F-4D97-AF65-F5344CB8AC3E}">
+        <p14:creationId xmlns:p14="http://schemas.microsoft.com/office/powerpoint/2010/main" val="2021748551"/>
+      </p:ext>
+    </p:extLst>
+  </p:cSld>
+  <p:clrMapOvr>
+    <a:masterClrMapping/>
+  </p:clrMapOvr>
+  <p:timing>
+    <p:tnLst>
+      <p:par>
+        <p:cTn id="1" dur="indefinite" restart="never" nodeType="tmRoot"/>
+      </p:par>
+    </p:tnLst>
+  </p:timing>
+</p:sld>
+</file>
+
+<file path=ppt/slides/slide4.xml><?xml version="1.0" encoding="utf-8"?>
+<p:sld xmlns:a="http://schemas.openxmlformats.org/drawingml/2006/main" xmlns:r="http://schemas.openxmlformats.org/officeDocument/2006/relationships" xmlns:p="http://schemas.openxmlformats.org/presentationml/2006/main">
+  <p:cSld>
+    <p:spTree>
+      <p:nvGrpSpPr>
+        <p:cNvPr id="1" name=""/>
+        <p:cNvGrpSpPr/>
+        <p:nvPr/>
+      </p:nvGrpSpPr>
+      <p:grpSpPr>
+        <a:xfrm>
+          <a:off x="0" y="0"/>
+          <a:ext cx="0" cy="0"/>
+          <a:chOff x="0" y="0"/>
+          <a:chExt cx="0" cy="0"/>
+        </a:xfrm>
+      </p:grpSpPr>
+      <p:sp>
+        <p:nvSpPr>
+          <p:cNvPr id="2" name="Title 1"/>
+          <p:cNvSpPr>
+            <a:spLocks noGrp="1"/>
+          </p:cNvSpPr>
+          <p:nvPr>
+            <p:ph type="title"/>
+          </p:nvPr>
+        </p:nvSpPr>
+        <p:spPr/>
+        <p:txBody>
+          <a:bodyPr>
+            <a:noAutofit/>
+          </a:bodyPr>
+          <a:lstStyle/>
+          <a:p>
+            <a:r>
+              <a:rPr lang="en-US" sz="8000" b="1" dirty="0" smtClean="0">
+                <a:solidFill>
+                  <a:srgbClr val="00642D"/>
+                </a:solidFill>
+              </a:rPr>
+              <a:t>Demo</a:t>
+            </a:r>
+            <a:endParaRPr lang="en-US" sz="8000" dirty="0"/>
+          </a:p>
+        </p:txBody>
+      </p:sp>
+      <p:sp>
+        <p:nvSpPr>
+          <p:cNvPr id="3" name="Content Placeholder 2"/>
+          <p:cNvSpPr>
+            <a:spLocks noGrp="1"/>
+          </p:cNvSpPr>
+          <p:nvPr>
+            <p:ph idx="1"/>
+          </p:nvPr>
+        </p:nvSpPr>
+        <p:spPr/>
+        <p:txBody>
+          <a:bodyPr/>
+          <a:lstStyle/>
+          <a:p>
+            <a:endParaRPr lang="en-US" dirty="0"/>
+          </a:p>
+        </p:txBody>
+      </p:sp>
+    </p:spTree>
+    <p:extLst>
+      <p:ext uri="{BB962C8B-B14F-4D97-AF65-F5344CB8AC3E}">
+        <p14:creationId xmlns:p14="http://schemas.microsoft.com/office/powerpoint/2010/main" val="975902045"/>
+      </p:ext>
+    </p:extLst>
+  </p:cSld>
+  <p:clrMapOvr>
+    <a:masterClrMapping/>
+  </p:clrMapOvr>
+</p:sld>
+</file>
+
+<file path=ppt/slides/slide5.xml><?xml version="1.0" encoding="utf-8"?>
+<p:sld xmlns:a="http://schemas.openxmlformats.org/drawingml/2006/main" xmlns:r="http://schemas.openxmlformats.org/officeDocument/2006/relationships" xmlns:p="http://schemas.openxmlformats.org/presentationml/2006/main">
+  <p:cSld>
+    <p:spTree>
+      <p:nvGrpSpPr>
+        <p:cNvPr id="1" name=""/>
+        <p:cNvGrpSpPr/>
+        <p:nvPr/>
+      </p:nvGrpSpPr>
+      <p:grpSpPr>
+        <a:xfrm>
+          <a:off x="0" y="0"/>
+          <a:ext cx="0" cy="0"/>
+          <a:chOff x="0" y="0"/>
+          <a:chExt cx="0" cy="0"/>
+        </a:xfrm>
+      </p:grpSpPr>
+      <p:pic>
+        <p:nvPicPr>
+          <p:cNvPr id="8" name="Picture 7"/>
+          <p:cNvPicPr>
+            <a:picLocks noChangeAspect="1"/>
+          </p:cNvPicPr>
+          <p:nvPr/>
+        </p:nvPicPr>
+        <p:blipFill>
+          <a:blip r:embed="rId2">
+            <a:extLst>
+              <a:ext uri="{28A0092B-C50C-407E-A947-70E740481C1C}">
+                <a14:useLocalDpi xmlns:a14="http://schemas.microsoft.com/office/drawing/2010/main" val="0"/>
+              </a:ext>
+            </a:extLst>
+          </a:blip>
+          <a:stretch>
+            <a:fillRect/>
+          </a:stretch>
+        </p:blipFill>
+        <p:spPr>
+          <a:xfrm>
+            <a:off x="990600" y="381000"/>
+            <a:ext cx="7219950" cy="6188529"/>
+          </a:xfrm>
+          <a:prstGeom prst="rect">
+            <a:avLst/>
+          </a:prstGeom>
+        </p:spPr>
+      </p:pic>
+    </p:spTree>
+    <p:extLst>
+      <p:ext uri="{BB962C8B-B14F-4D97-AF65-F5344CB8AC3E}">
+        <p14:creationId xmlns:p14="http://schemas.microsoft.com/office/powerpoint/2010/main" val="2927391004"/>
+      </p:ext>
+    </p:extLst>
+  </p:cSld>
+  <p:clrMapOvr>
+    <a:masterClrMapping/>
+  </p:clrMapOvr>
+  <p:timing>
+    <p:tnLst>
+      <p:par>
+        <p:cTn id="1" dur="indefinite" restart="never" nodeType="tmRoot"/>
+      </p:par>
+    </p:tnLst>
+  </p:timing>
+</p:sld>
+</file>
+
+<file path=ppt/slides/slide6.xml><?xml version="1.0" encoding="utf-8"?>
+<p:sld xmlns:a="http://schemas.openxmlformats.org/drawingml/2006/main" xmlns:r="http://schemas.openxmlformats.org/officeDocument/2006/relationships" xmlns:p="http://schemas.openxmlformats.org/presentationml/2006/main">
+  <p:cSld>
+    <p:spTree>
+      <p:nvGrpSpPr>
+        <p:cNvPr id="1" name=""/>
+        <p:cNvGrpSpPr/>
+        <p:nvPr/>
+      </p:nvGrpSpPr>
+      <p:grpSpPr>
+        <a:xfrm>
+          <a:off x="0" y="0"/>
+          <a:ext cx="0" cy="0"/>
+          <a:chOff x="0" y="0"/>
+          <a:chExt cx="0" cy="0"/>
+        </a:xfrm>
+      </p:grpSpPr>
+      <p:pic>
+        <p:nvPicPr>
+          <p:cNvPr id="2" name="Picture 1"/>
+          <p:cNvPicPr>
+            <a:picLocks noChangeAspect="1"/>
+          </p:cNvPicPr>
+          <p:nvPr/>
+        </p:nvPicPr>
+        <p:blipFill>
+          <a:blip r:embed="rId2">
+            <a:extLst>
+              <a:ext uri="{28A0092B-C50C-407E-A947-70E740481C1C}">
+                <a14:useLocalDpi xmlns:a14="http://schemas.microsoft.com/office/drawing/2010/main" val="0"/>
+              </a:ext>
+            </a:extLst>
+          </a:blip>
+          <a:stretch>
+            <a:fillRect/>
+          </a:stretch>
+        </p:blipFill>
+        <p:spPr>
+          <a:xfrm>
+            <a:off x="1143000" y="355268"/>
+            <a:ext cx="7122968" cy="6105401"/>
+          </a:xfrm>
+          <a:prstGeom prst="rect">
+            <a:avLst/>
+          </a:prstGeom>
+        </p:spPr>
+      </p:pic>
+    </p:spTree>
+    <p:extLst>
+      <p:ext uri="{BB962C8B-B14F-4D97-AF65-F5344CB8AC3E}">
+        <p14:creationId xmlns:p14="http://schemas.microsoft.com/office/powerpoint/2010/main" val="3325679948"/>
+      </p:ext>
+    </p:extLst>
+  </p:cSld>
+  <p:clrMapOvr>
+    <a:masterClrMapping/>
+  </p:clrMapOvr>
+  <p:timing>
+    <p:tnLst>
+      <p:par>
+        <p:cTn id="1" dur="indefinite" restart="never" nodeType="tmRoot"/>
+      </p:par>
+    </p:tnLst>
+  </p:timing>
+</p:sld>
+</file>
+
+<file path=ppt/slides/slide7.xml><?xml version="1.0" encoding="utf-8"?>
+<p:sld xmlns:a="http://schemas.openxmlformats.org/drawingml/2006/main" xmlns:r="http://schemas.openxmlformats.org/officeDocument/2006/relationships" xmlns:p="http://schemas.openxmlformats.org/presentationml/2006/main">
+  <p:cSld>
+    <p:spTree>
+      <p:nvGrpSpPr>
+        <p:cNvPr id="1" name=""/>
+        <p:cNvGrpSpPr/>
+        <p:nvPr/>
+      </p:nvGrpSpPr>
+      <p:grpSpPr>
+        <a:xfrm>
+          <a:off x="0" y="0"/>
+          <a:ext cx="0" cy="0"/>
+          <a:chOff x="0" y="0"/>
+          <a:chExt cx="0" cy="0"/>
+        </a:xfrm>
+      </p:grpSpPr>
+      <p:pic>
+        <p:nvPicPr>
+          <p:cNvPr id="2" name="Picture 1"/>
+          <p:cNvPicPr>
+            <a:picLocks noChangeAspect="1"/>
+          </p:cNvPicPr>
+          <p:nvPr/>
+        </p:nvPicPr>
+        <p:blipFill>
+          <a:blip r:embed="rId2">
+            <a:extLst>
+              <a:ext uri="{28A0092B-C50C-407E-A947-70E740481C1C}">
+                <a14:useLocalDpi xmlns:a14="http://schemas.microsoft.com/office/drawing/2010/main" val="0"/>
+              </a:ext>
+            </a:extLst>
+          </a:blip>
+          <a:stretch>
+            <a:fillRect/>
+          </a:stretch>
+        </p:blipFill>
+        <p:spPr>
+          <a:xfrm>
+            <a:off x="1143000" y="326572"/>
+            <a:ext cx="6991350" cy="5992586"/>
+          </a:xfrm>
+          <a:prstGeom prst="rect">
+            <a:avLst/>
+          </a:prstGeom>
+        </p:spPr>
+      </p:pic>
+    </p:spTree>
+    <p:extLst>
+      <p:ext uri="{BB962C8B-B14F-4D97-AF65-F5344CB8AC3E}">
+        <p14:creationId xmlns:p14="http://schemas.microsoft.com/office/powerpoint/2010/main" val="1376263727"/>
+      </p:ext>
+    </p:extLst>
+  </p:cSld>
+  <p:clrMapOvr>
+    <a:masterClrMapping/>
+  </p:clrMapOvr>
+  <p:timing>
+    <p:tnLst>
+      <p:par>
+        <p:cTn id="1" dur="indefinite" restart="never" nodeType="tmRoot"/>
+      </p:par>
+    </p:tnLst>
+  </p:timing>
+</p:sld>
+</file>
+
+<file path=ppt/slides/slide8.xml><?xml version="1.0" encoding="utf-8"?>
+<p:sld xmlns:a="http://schemas.openxmlformats.org/drawingml/2006/main" xmlns:r="http://schemas.openxmlformats.org/officeDocument/2006/relationships" xmlns:p="http://schemas.openxmlformats.org/presentationml/2006/main">
+  <p:cSld>
+    <p:spTree>
+      <p:nvGrpSpPr>
+        <p:cNvPr id="1" name=""/>
+        <p:cNvGrpSpPr/>
+        <p:nvPr/>
+      </p:nvGrpSpPr>
+      <p:grpSpPr>
+        <a:xfrm>
+          <a:off x="0" y="0"/>
+          <a:ext cx="0" cy="0"/>
+          <a:chOff x="0" y="0"/>
+          <a:chExt cx="0" cy="0"/>
+        </a:xfrm>
+      </p:grpSpPr>
+      <p:pic>
+        <p:nvPicPr>
+          <p:cNvPr id="2" name="Picture 1"/>
+          <p:cNvPicPr>
+            <a:picLocks noChangeAspect="1"/>
+          </p:cNvPicPr>
+          <p:nvPr/>
+        </p:nvPicPr>
+        <p:blipFill>
+          <a:blip r:embed="rId2">
+            <a:extLst>
+              <a:ext uri="{28A0092B-C50C-407E-A947-70E740481C1C}">
+                <a14:useLocalDpi xmlns:a14="http://schemas.microsoft.com/office/drawing/2010/main" val="0"/>
+              </a:ext>
+            </a:extLst>
+          </a:blip>
+          <a:stretch>
+            <a:fillRect/>
+          </a:stretch>
+        </p:blipFill>
+        <p:spPr>
+          <a:xfrm>
+            <a:off x="1138381" y="401782"/>
+            <a:ext cx="6905914" cy="5919356"/>
+          </a:xfrm>
+          <a:prstGeom prst="rect">
+            <a:avLst/>
+          </a:prstGeom>
+        </p:spPr>
+      </p:pic>
+    </p:spTree>
+    <p:extLst>
+      <p:ext uri="{BB962C8B-B14F-4D97-AF65-F5344CB8AC3E}">
+        <p14:creationId xmlns:p14="http://schemas.microsoft.com/office/powerpoint/2010/main" val="2271531421"/>
       </p:ext>
     </p:extLst>
   </p:cSld>
@@ -3874,25 +4043,20 @@
             <p:ph type="title"/>
           </p:nvPr>
         </p:nvSpPr>
-        <p:spPr>
-          <a:xfrm>
-            <a:off x="457200" y="2590800"/>
-            <a:ext cx="8229600" cy="1143000"/>
-          </a:xfrm>
-        </p:spPr>
-        <p:txBody>
-          <a:bodyPr/>
-          <a:lstStyle/>
-          <a:p>
-            <a:r>
-              <a:rPr lang="en-US" b="1" dirty="0" smtClean="0">
+        <p:spPr/>
+        <p:txBody>
+          <a:bodyPr/>
+          <a:lstStyle/>
+          <a:p>
+            <a:r>
+              <a:rPr lang="en-US" dirty="0" smtClean="0">
                 <a:solidFill>
                   <a:srgbClr val="00642D"/>
                 </a:solidFill>
               </a:rPr>
-              <a:t>Thank you for your attention!</a:t>
-            </a:r>
-            <a:endParaRPr lang="en-US" b="1" dirty="0">
+              <a:t>An Android Alternative</a:t>
+            </a:r>
+            <a:endParaRPr lang="en-US" dirty="0">
               <a:solidFill>
                 <a:srgbClr val="00642D"/>
               </a:solidFill>
@@ -3900,10 +4064,39 @@
           </a:p>
         </p:txBody>
       </p:sp>
+      <p:pic>
+        <p:nvPicPr>
+          <p:cNvPr id="7" name="Content Placeholder 6"/>
+          <p:cNvPicPr>
+            <a:picLocks noGrp="1" noChangeAspect="1"/>
+          </p:cNvPicPr>
+          <p:nvPr>
+            <p:ph idx="1"/>
+          </p:nvPr>
+        </p:nvPicPr>
+        <p:blipFill>
+          <a:blip r:embed="rId2" cstate="print">
+            <a:extLst>
+              <a:ext uri="{28A0092B-C50C-407E-A947-70E740481C1C}">
+                <a14:useLocalDpi xmlns:a14="http://schemas.microsoft.com/office/drawing/2010/main" val="0"/>
+              </a:ext>
+            </a:extLst>
+          </a:blip>
+          <a:stretch>
+            <a:fillRect/>
+          </a:stretch>
+        </p:blipFill>
+        <p:spPr>
+          <a:xfrm>
+            <a:off x="3157636" y="1422400"/>
+            <a:ext cx="3111499" cy="4978400"/>
+          </a:xfrm>
+        </p:spPr>
+      </p:pic>
     </p:spTree>
     <p:extLst>
       <p:ext uri="{BB962C8B-B14F-4D97-AF65-F5344CB8AC3E}">
-        <p14:creationId xmlns:p14="http://schemas.microsoft.com/office/powerpoint/2010/main" val="3737794404"/>
+        <p14:creationId xmlns:p14="http://schemas.microsoft.com/office/powerpoint/2010/main" val="121013334"/>
       </p:ext>
     </p:extLst>
   </p:cSld>

</xml_diff>